<commit_message>
Add tons of shit
</commit_message>
<xml_diff>
--- a/slides/r11-filesystems.pptx
+++ b/slides/r11-filesystems.pptx
@@ -1485,7 +1485,7 @@
   <dgm:whole/>
   <dgm:extLst>
     <a:ext uri="http://schemas.microsoft.com/office/drawing/2008/diagram">
-      <dsp:dataModelExt xmlns:dsp="http://schemas.microsoft.com/office/drawing/2008/diagram" relId="rId7" minVer="http://schemas.openxmlformats.org/drawingml/2006/diagram"/>
+      <dsp:dataModelExt xmlns:dsp="http://schemas.microsoft.com/office/drawing/2008/diagram" relId="rId6" minVer="http://schemas.openxmlformats.org/drawingml/2006/diagram"/>
     </a:ext>
   </dgm:extLst>
 </dgm:dataModel>
@@ -3744,7 +3744,7 @@
           <a:p>
             <a:fld id="{E1E9A386-374F-46B8-905A-6C0BF92B68B0}" type="datetimeFigureOut">
               <a:rPr lang="en-US" smtClean="0"/>
-              <a:t>5/27/2023</a:t>
+              <a:t>5/30/2024</a:t>
             </a:fld>
             <a:endParaRPr lang="en-US"/>
           </a:p>
@@ -4057,11 +4057,11 @@
           <a:bodyPr/>
           <a:lstStyle/>
           <a:p>
-            <a:r>
-              <a:rPr lang="en-US" dirty="0"/>
-              <a:t>Disk on key , HDD, SDD ..</a:t>
-            </a:r>
-            <a:endParaRPr lang="en-IL" dirty="0"/>
+            <a:pPr algn="l" rtl="0"/>
+            <a:endParaRPr lang="he-IL" dirty="0">
+              <a:latin typeface="Arial"/>
+              <a:cs typeface="Arial"/>
+            </a:endParaRPr>
           </a:p>
         </p:txBody>
       </p:sp>
@@ -4082,7 +4082,7 @@
           <a:p>
             <a:fld id="{94525A9A-2399-4ACF-975E-77FD324B061A}" type="slidenum">
               <a:rPr lang="en-US" smtClean="0"/>
-              <a:t>2</a:t>
+              <a:t>4</a:t>
             </a:fld>
             <a:endParaRPr lang="en-US"/>
           </a:p>
@@ -4091,7 +4091,7 @@
     </p:spTree>
     <p:extLst>
       <p:ext uri="{BB962C8B-B14F-4D97-AF65-F5344CB8AC3E}">
-        <p14:creationId xmlns:p14="http://schemas.microsoft.com/office/powerpoint/2010/main" val="1333302370"/>
+        <p14:creationId xmlns:p14="http://schemas.microsoft.com/office/powerpoint/2010/main" val="3525922662"/>
       </p:ext>
     </p:extLst>
   </p:cSld>
@@ -5078,11 +5078,27 @@
           <a:bodyPr/>
           <a:lstStyle/>
           <a:p>
-            <a:pPr algn="l" rtl="0"/>
-            <a:endParaRPr lang="he-IL" dirty="0">
-              <a:latin typeface="Arial"/>
-              <a:cs typeface="Arial"/>
-            </a:endParaRPr>
+            <a:pPr algn="r" rtl="1"/>
+            <a:r>
+              <a:rPr lang="he-IL" dirty="0"/>
+              <a:t>תשובה: </a:t>
+            </a:r>
+            <a:r>
+              <a:rPr lang="en-US" dirty="0"/>
+              <a:t>4KB</a:t>
+            </a:r>
+            <a:r>
+              <a:rPr lang="he-IL" dirty="0"/>
+              <a:t> זהו גודל הדף/מסגרת במערכת הזיכרון הוירטואלי.</a:t>
+            </a:r>
+          </a:p>
+          <a:p>
+            <a:pPr algn="r" rtl="1"/>
+            <a:r>
+              <a:rPr lang="he-IL" dirty="0"/>
+              <a:t>מכיוון שמידע עובר בין הדיסק לזיכרון (ולהיפך) באופן קבוע, נוח יותר למערכת ההפעלה לנהל את הזיכרון והדיסק באותה גרנולריות.</a:t>
+            </a:r>
+            <a:endParaRPr lang="en-US" dirty="0"/>
           </a:p>
         </p:txBody>
       </p:sp>
@@ -5103,7 +5119,7 @@
           <a:p>
             <a:fld id="{94525A9A-2399-4ACF-975E-77FD324B061A}" type="slidenum">
               <a:rPr lang="en-US" smtClean="0"/>
-              <a:t>4</a:t>
+              <a:t>5</a:t>
             </a:fld>
             <a:endParaRPr lang="en-US"/>
           </a:p>
@@ -5112,7 +5128,7 @@
     </p:spTree>
     <p:extLst>
       <p:ext uri="{BB962C8B-B14F-4D97-AF65-F5344CB8AC3E}">
-        <p14:creationId xmlns:p14="http://schemas.microsoft.com/office/powerpoint/2010/main" val="3525922662"/>
+        <p14:creationId xmlns:p14="http://schemas.microsoft.com/office/powerpoint/2010/main" val="3985805483"/>
       </p:ext>
     </p:extLst>
   </p:cSld>
@@ -6335,25 +6351,6 @@
           <a:lstStyle/>
           <a:p>
             <a:pPr algn="r" rtl="1"/>
-            <a:r>
-              <a:rPr lang="he-IL" dirty="0"/>
-              <a:t>תשובה: </a:t>
-            </a:r>
-            <a:r>
-              <a:rPr lang="en-US" dirty="0"/>
-              <a:t>4KB</a:t>
-            </a:r>
-            <a:r>
-              <a:rPr lang="he-IL" dirty="0"/>
-              <a:t> זהו גודל הדף/מסגרת במערכת הזיכרון הוירטואלי.</a:t>
-            </a:r>
-          </a:p>
-          <a:p>
-            <a:pPr algn="r" rtl="1"/>
-            <a:r>
-              <a:rPr lang="he-IL" dirty="0"/>
-              <a:t>מכיוון שמידע עובר בין הדיסק לזיכרון (ולהיפך) באופן קבוע, נוח יותר למערכת ההפעלה לנהל את הזיכרון והדיסק באותה גרנולריות.</a:t>
-            </a:r>
             <a:endParaRPr lang="en-US" dirty="0"/>
           </a:p>
         </p:txBody>
@@ -6375,7 +6372,7 @@
           <a:p>
             <a:fld id="{94525A9A-2399-4ACF-975E-77FD324B061A}" type="slidenum">
               <a:rPr lang="en-US" smtClean="0"/>
-              <a:t>5</a:t>
+              <a:t>6</a:t>
             </a:fld>
             <a:endParaRPr lang="en-US"/>
           </a:p>
@@ -6384,7 +6381,7 @@
     </p:spTree>
     <p:extLst>
       <p:ext uri="{BB962C8B-B14F-4D97-AF65-F5344CB8AC3E}">
-        <p14:creationId xmlns:p14="http://schemas.microsoft.com/office/powerpoint/2010/main" val="3985805483"/>
+        <p14:creationId xmlns:p14="http://schemas.microsoft.com/office/powerpoint/2010/main" val="154592082"/>
       </p:ext>
     </p:extLst>
   </p:cSld>
@@ -6797,6 +6794,18 @@
           <a:lstStyle/>
           <a:p>
             <a:pPr algn="r" rtl="1"/>
+            <a:r>
+              <a:rPr lang="he-IL" dirty="0"/>
+              <a:t>על קריאות המערכת </a:t>
+            </a:r>
+            <a:r>
+              <a:rPr lang="en-US" dirty="0"/>
+              <a:t>open()/close()/read()/write()</a:t>
+            </a:r>
+            <a:r>
+              <a:rPr lang="he-IL" dirty="0"/>
+              <a:t> כבר דיברנו הרבה במהלך הקורס, ולכן לא נדבר עליהן שוב כאן.</a:t>
+            </a:r>
             <a:endParaRPr lang="en-US" dirty="0"/>
           </a:p>
         </p:txBody>
@@ -6818,7 +6827,7 @@
           <a:p>
             <a:fld id="{94525A9A-2399-4ACF-975E-77FD324B061A}" type="slidenum">
               <a:rPr lang="en-US" smtClean="0"/>
-              <a:t>6</a:t>
+              <a:t>7</a:t>
             </a:fld>
             <a:endParaRPr lang="en-US"/>
           </a:p>
@@ -6827,7 +6836,7 @@
     </p:spTree>
     <p:extLst>
       <p:ext uri="{BB962C8B-B14F-4D97-AF65-F5344CB8AC3E}">
-        <p14:creationId xmlns:p14="http://schemas.microsoft.com/office/powerpoint/2010/main" val="154592082"/>
+        <p14:creationId xmlns:p14="http://schemas.microsoft.com/office/powerpoint/2010/main" val="2010554987"/>
       </p:ext>
     </p:extLst>
   </p:cSld>
@@ -6881,20 +6890,24 @@
           <a:bodyPr/>
           <a:lstStyle/>
           <a:p>
-            <a:pPr algn="r" rtl="1"/>
-            <a:r>
-              <a:rPr lang="he-IL" dirty="0"/>
-              <a:t>על קריאות המערכת </a:t>
-            </a:r>
-            <a:r>
-              <a:rPr lang="en-US" dirty="0"/>
-              <a:t>open()/close()/read()/write()</a:t>
-            </a:r>
-            <a:r>
-              <a:rPr lang="he-IL" dirty="0"/>
-              <a:t> כבר דיברנו הרבה במהלך הקורס, ולכן לא נדבר עליהן שוב כאן.</a:t>
-            </a:r>
-            <a:endParaRPr lang="en-US" dirty="0"/>
+            <a:pPr marL="0" marR="0" lvl="0" indent="0" algn="r" defTabSz="914400" rtl="1" eaLnBrk="1" fontAlgn="auto" latinLnBrk="0" hangingPunct="1">
+              <a:lnSpc>
+                <a:spcPct val="100000"/>
+              </a:lnSpc>
+              <a:spcBef>
+                <a:spcPts val="0"/>
+              </a:spcBef>
+              <a:spcAft>
+                <a:spcPts val="0"/>
+              </a:spcAft>
+              <a:buClrTx/>
+              <a:buSzTx/>
+              <a:buFontTx/>
+              <a:buNone/>
+              <a:tabLst/>
+              <a:defRPr/>
+            </a:pPr>
+            <a:endParaRPr lang="he-IL" altLang="en-US" dirty="0"/>
           </a:p>
         </p:txBody>
       </p:sp>
@@ -6915,7 +6928,7 @@
           <a:p>
             <a:fld id="{94525A9A-2399-4ACF-975E-77FD324B061A}" type="slidenum">
               <a:rPr lang="en-US" smtClean="0"/>
-              <a:t>7</a:t>
+              <a:t>8</a:t>
             </a:fld>
             <a:endParaRPr lang="en-US"/>
           </a:p>
@@ -6924,7 +6937,7 @@
     </p:spTree>
     <p:extLst>
       <p:ext uri="{BB962C8B-B14F-4D97-AF65-F5344CB8AC3E}">
-        <p14:creationId xmlns:p14="http://schemas.microsoft.com/office/powerpoint/2010/main" val="2010554987"/>
+        <p14:creationId xmlns:p14="http://schemas.microsoft.com/office/powerpoint/2010/main" val="4240029716"/>
       </p:ext>
     </p:extLst>
   </p:cSld>
@@ -6978,32 +6991,35 @@
           <a:bodyPr/>
           <a:lstStyle/>
           <a:p>
-            <a:pPr marL="0" marR="0" lvl="0" indent="0" algn="r" defTabSz="914400" rtl="1" eaLnBrk="1" fontAlgn="auto" latinLnBrk="0" hangingPunct="1">
-              <a:lnSpc>
-                <a:spcPct val="100000"/>
-              </a:lnSpc>
-              <a:spcBef>
-                <a:spcPts val="0"/>
-              </a:spcBef>
-              <a:spcAft>
-                <a:spcPts val="0"/>
-              </a:spcAft>
-              <a:buClrTx/>
-              <a:buSzTx/>
-              <a:buFontTx/>
-              <a:buNone/>
-              <a:tabLst/>
-              <a:defRPr/>
-            </a:pPr>
-            <a:r>
-              <a:rPr lang="en-US" altLang="en-US" dirty="0" err="1"/>
-              <a:t>Inode</a:t>
-            </a:r>
-            <a:r>
-              <a:rPr lang="en-US" altLang="en-US" dirty="0"/>
-              <a:t> – index node</a:t>
-            </a:r>
-            <a:endParaRPr lang="he-IL" altLang="en-US" dirty="0"/>
+            <a:pPr algn="r" rtl="1"/>
+            <a:r>
+              <a:rPr lang="he-IL" dirty="0"/>
+              <a:t>תשובה: מספר הבלוקים המופיע בשקף הוא בעצם מספר הסקטורים על הדיסק.</a:t>
+            </a:r>
+          </a:p>
+          <a:p>
+            <a:pPr algn="r" rtl="1"/>
+            <a:r>
+              <a:rPr lang="he-IL" dirty="0"/>
+              <a:t>8 סקטורים בני </a:t>
+            </a:r>
+            <a:r>
+              <a:rPr lang="en-US" dirty="0"/>
+              <a:t>512B</a:t>
+            </a:r>
+            <a:r>
+              <a:rPr lang="he-IL" dirty="0"/>
+              <a:t> הם בדיוק בלוק אחד בגודל </a:t>
+            </a:r>
+            <a:r>
+              <a:rPr lang="en-US" dirty="0"/>
+              <a:t>4KB</a:t>
+            </a:r>
+            <a:r>
+              <a:rPr lang="he-IL"/>
+              <a:t>, שהוא הגודל המינימלי לקובץ במקרה שלנו.</a:t>
+            </a:r>
+            <a:endParaRPr lang="en-US" dirty="0"/>
           </a:p>
         </p:txBody>
       </p:sp>
@@ -7024,7 +7040,7 @@
           <a:p>
             <a:fld id="{94525A9A-2399-4ACF-975E-77FD324B061A}" type="slidenum">
               <a:rPr lang="en-US" smtClean="0"/>
-              <a:t>8</a:t>
+              <a:t>9</a:t>
             </a:fld>
             <a:endParaRPr lang="en-US"/>
           </a:p>
@@ -7033,7 +7049,7 @@
     </p:spTree>
     <p:extLst>
       <p:ext uri="{BB962C8B-B14F-4D97-AF65-F5344CB8AC3E}">
-        <p14:creationId xmlns:p14="http://schemas.microsoft.com/office/powerpoint/2010/main" val="4240029716"/>
+        <p14:creationId xmlns:p14="http://schemas.microsoft.com/office/powerpoint/2010/main" val="849002920"/>
       </p:ext>
     </p:extLst>
   </p:cSld>
@@ -7087,33 +7103,26 @@
           <a:bodyPr/>
           <a:lstStyle/>
           <a:p>
-            <a:pPr algn="r" rtl="1"/>
-            <a:r>
-              <a:rPr lang="he-IL" dirty="0"/>
-              <a:t>תשובה: מספר הבלוקים המופיע בשקף הוא בעצם מספר הסקטורים על הדיסק.</a:t>
-            </a:r>
-          </a:p>
-          <a:p>
-            <a:pPr algn="r" rtl="1"/>
-            <a:r>
-              <a:rPr lang="he-IL" dirty="0"/>
-              <a:t>8 סקטורים בני </a:t>
-            </a:r>
-            <a:r>
-              <a:rPr lang="en-US" dirty="0"/>
-              <a:t>512B</a:t>
-            </a:r>
-            <a:r>
-              <a:rPr lang="he-IL" dirty="0"/>
-              <a:t> הם בדיוק בלוק אחד בגודל </a:t>
-            </a:r>
-            <a:r>
-              <a:rPr lang="en-US" dirty="0"/>
-              <a:t>4KB</a:t>
-            </a:r>
-            <a:r>
-              <a:rPr lang="he-IL"/>
-              <a:t>, שהוא הגודל המינימלי לקובץ במקרה שלנו.</a:t>
+            <a:pPr marL="0" marR="0" lvl="0" indent="0" algn="r" defTabSz="914400" rtl="1" eaLnBrk="1" fontAlgn="auto" latinLnBrk="0" hangingPunct="1">
+              <a:lnSpc>
+                <a:spcPct val="100000"/>
+              </a:lnSpc>
+              <a:spcBef>
+                <a:spcPts val="0"/>
+              </a:spcBef>
+              <a:spcAft>
+                <a:spcPts val="0"/>
+              </a:spcAft>
+              <a:buClrTx/>
+              <a:buSzTx/>
+              <a:buFontTx/>
+              <a:buNone/>
+              <a:tabLst/>
+              <a:defRPr/>
+            </a:pPr>
+            <a:r>
+              <a:rPr lang="he-IL" dirty="0"/>
+              <a:t>אם התיקיה הנוכחית היא תיקיית השורש אז ".." מצביע לתיקיית השורש.</a:t>
             </a:r>
             <a:endParaRPr lang="en-US" dirty="0"/>
           </a:p>
@@ -7136,7 +7145,7 @@
           <a:p>
             <a:fld id="{94525A9A-2399-4ACF-975E-77FD324B061A}" type="slidenum">
               <a:rPr lang="en-US" smtClean="0"/>
-              <a:t>9</a:t>
+              <a:t>10</a:t>
             </a:fld>
             <a:endParaRPr lang="en-US"/>
           </a:p>
@@ -7145,7 +7154,7 @@
     </p:spTree>
     <p:extLst>
       <p:ext uri="{BB962C8B-B14F-4D97-AF65-F5344CB8AC3E}">
-        <p14:creationId xmlns:p14="http://schemas.microsoft.com/office/powerpoint/2010/main" val="849002920"/>
+        <p14:creationId xmlns:p14="http://schemas.microsoft.com/office/powerpoint/2010/main" val="3251836579"/>
       </p:ext>
     </p:extLst>
   </p:cSld>
@@ -7199,28 +7208,7 @@
           <a:bodyPr/>
           <a:lstStyle/>
           <a:p>
-            <a:pPr marL="0" marR="0" lvl="0" indent="0" algn="r" defTabSz="914400" rtl="1" eaLnBrk="1" fontAlgn="auto" latinLnBrk="0" hangingPunct="1">
-              <a:lnSpc>
-                <a:spcPct val="100000"/>
-              </a:lnSpc>
-              <a:spcBef>
-                <a:spcPts val="0"/>
-              </a:spcBef>
-              <a:spcAft>
-                <a:spcPts val="0"/>
-              </a:spcAft>
-              <a:buClrTx/>
-              <a:buSzTx/>
-              <a:buFontTx/>
-              <a:buNone/>
-              <a:tabLst/>
-              <a:defRPr/>
-            </a:pPr>
-            <a:r>
-              <a:rPr lang="he-IL" dirty="0"/>
-              <a:t>אם התיקיה הנוכחית היא תיקיית השורש אז ".." מצביע לתיקיית השורש.</a:t>
-            </a:r>
-            <a:endParaRPr lang="en-US" dirty="0"/>
+            <a:endParaRPr lang="en-IL" dirty="0"/>
           </a:p>
         </p:txBody>
       </p:sp>
@@ -7241,7 +7229,7 @@
           <a:p>
             <a:fld id="{94525A9A-2399-4ACF-975E-77FD324B061A}" type="slidenum">
               <a:rPr lang="en-US" smtClean="0"/>
-              <a:t>10</a:t>
+              <a:t>11</a:t>
             </a:fld>
             <a:endParaRPr lang="en-US"/>
           </a:p>
@@ -7250,7 +7238,7 @@
     </p:spTree>
     <p:extLst>
       <p:ext uri="{BB962C8B-B14F-4D97-AF65-F5344CB8AC3E}">
-        <p14:creationId xmlns:p14="http://schemas.microsoft.com/office/powerpoint/2010/main" val="3251836579"/>
+        <p14:creationId xmlns:p14="http://schemas.microsoft.com/office/powerpoint/2010/main" val="2676849202"/>
       </p:ext>
     </p:extLst>
   </p:cSld>
@@ -7559,7 +7547,7 @@
           <a:p>
             <a:fld id="{801E54B0-6234-4C6C-A514-3AEB3FA215CF}" type="datetime2">
               <a:rPr lang="en-US" smtClean="0"/>
-              <a:t>Saturday, May 27, 2023</a:t>
+              <a:t>Thursday, May 30, 2024</a:t>
             </a:fld>
             <a:endParaRPr lang="en-US"/>
           </a:p>
@@ -7770,7 +7758,7 @@
           <a:p>
             <a:fld id="{CCDDDE4B-66DD-4611-9F9F-D5ECC5B05C9B}" type="datetime2">
               <a:rPr lang="en-US" smtClean="0"/>
-              <a:t>Saturday, May 27, 2023</a:t>
+              <a:t>Thursday, May 30, 2024</a:t>
             </a:fld>
             <a:endParaRPr lang="en-US"/>
           </a:p>
@@ -7951,7 +7939,7 @@
           <a:p>
             <a:fld id="{B85061F1-55BF-4F10-9A04-18C249B338E9}" type="datetime2">
               <a:rPr lang="en-US" smtClean="0"/>
-              <a:t>Saturday, May 27, 2023</a:t>
+              <a:t>Thursday, May 30, 2024</a:t>
             </a:fld>
             <a:endParaRPr lang="en-US"/>
           </a:p>
@@ -8120,7 +8108,7 @@
           <a:p>
             <a:fld id="{256915EB-1283-40F9-83FD-470A89F0734C}" type="datetime2">
               <a:rPr lang="en-US" smtClean="0"/>
-              <a:t>Saturday, May 27, 2023</a:t>
+              <a:t>Thursday, May 30, 2024</a:t>
             </a:fld>
             <a:endParaRPr lang="en-US"/>
           </a:p>
@@ -8374,7 +8362,7 @@
           <a:p>
             <a:fld id="{60FD7C44-6910-4D90-B2C9-3CB89EE74DCD}" type="datetime2">
               <a:rPr lang="en-US" smtClean="0"/>
-              <a:t>Saturday, May 27, 2023</a:t>
+              <a:t>Thursday, May 30, 2024</a:t>
             </a:fld>
             <a:endParaRPr lang="en-US"/>
           </a:p>
@@ -8699,7 +8687,7 @@
           <a:p>
             <a:fld id="{D1552E2A-7C70-4728-8740-3BF4B42E833F}" type="datetime2">
               <a:rPr lang="en-US" smtClean="0"/>
-              <a:t>Saturday, May 27, 2023</a:t>
+              <a:t>Thursday, May 30, 2024</a:t>
             </a:fld>
             <a:endParaRPr lang="en-US"/>
           </a:p>
@@ -9170,7 +9158,7 @@
           <a:p>
             <a:fld id="{2EC2CB2A-EEE7-4C31-8C43-8AD51D260F29}" type="datetime2">
               <a:rPr lang="en-US" smtClean="0"/>
-              <a:t>Saturday, May 27, 2023</a:t>
+              <a:t>Thursday, May 30, 2024</a:t>
             </a:fld>
             <a:endParaRPr lang="en-US"/>
           </a:p>
@@ -9323,7 +9311,7 @@
           <a:p>
             <a:fld id="{73EEA51E-D1C6-4FFC-A297-AD7207FCA3BA}" type="datetime2">
               <a:rPr lang="en-US" smtClean="0"/>
-              <a:t>Saturday, May 27, 2023</a:t>
+              <a:t>Thursday, May 30, 2024</a:t>
             </a:fld>
             <a:endParaRPr lang="en-US"/>
           </a:p>
@@ -9419,7 +9407,7 @@
           <a:p>
             <a:fld id="{FA72B028-F7CE-4E2A-9212-73BF6868593C}" type="datetime2">
               <a:rPr lang="en-US" smtClean="0"/>
-              <a:t>Saturday, May 27, 2023</a:t>
+              <a:t>Thursday, May 30, 2024</a:t>
             </a:fld>
             <a:endParaRPr lang="en-US"/>
           </a:p>
@@ -9699,7 +9687,7 @@
           <a:p>
             <a:fld id="{0675F8AA-FFD7-4FD7-8E93-2B0BBB706CBB}" type="datetime2">
               <a:rPr lang="en-US" smtClean="0"/>
-              <a:t>Saturday, May 27, 2023</a:t>
+              <a:t>Thursday, May 30, 2024</a:t>
             </a:fld>
             <a:endParaRPr lang="en-US"/>
           </a:p>
@@ -10010,7 +9998,7 @@
           <a:p>
             <a:fld id="{5774B054-C123-4020-A757-578981F89122}" type="datetime2">
               <a:rPr lang="en-US" smtClean="0"/>
-              <a:t>Saturday, May 27, 2023</a:t>
+              <a:t>Thursday, May 30, 2024</a:t>
             </a:fld>
             <a:endParaRPr lang="en-US"/>
           </a:p>
@@ -10306,13 +10294,16 @@
                 <a:solidFill>
                   <a:srgbClr val="FFFFFF"/>
                 </a:solidFill>
+                <a:latin typeface="Lucida Sans Unicode" panose="020B0602030504020204" pitchFamily="34" charset="0"/>
+                <a:cs typeface="Lucida Sans Unicode" panose="020B0602030504020204" pitchFamily="34" charset="0"/>
               </a:defRPr>
             </a:lvl1pPr>
           </a:lstStyle>
           <a:p>
             <a:fld id="{B3F0B518-26AC-4E63-9CA4-2F1140207E71}" type="datetime2">
               <a:rPr lang="en-US" smtClean="0"/>
-              <a:t>Saturday, May 27, 2023</a:t>
+              <a:pPr/>
+              <a:t>Thursday, May 30, 2024</a:t>
             </a:fld>
             <a:endParaRPr lang="en-US" dirty="0"/>
           </a:p>
@@ -10345,12 +10336,14 @@
                 <a:solidFill>
                   <a:srgbClr val="FFFFFF"/>
                 </a:solidFill>
+                <a:latin typeface="Lucida Sans Unicode" panose="020B0602030504020204" pitchFamily="34" charset="0"/>
+                <a:cs typeface="Lucida Sans Unicode" panose="020B0602030504020204" pitchFamily="34" charset="0"/>
               </a:defRPr>
             </a:lvl1pPr>
           </a:lstStyle>
           <a:p>
             <a:r>
-              <a:rPr lang="he-IL"/>
+              <a:rPr lang="he-IL" dirty="0"/>
               <a:t>מערכות הפעלה - תרגול 13</a:t>
             </a:r>
             <a:endParaRPr lang="en-US" dirty="0"/>
@@ -10384,6 +10377,8 @@
                 <a:solidFill>
                   <a:srgbClr val="FFFFFF"/>
                 </a:solidFill>
+                <a:latin typeface="Lucida Sans Unicode" panose="020B0602030504020204" pitchFamily="34" charset="0"/>
+                <a:cs typeface="Lucida Sans Unicode" panose="020B0602030504020204" pitchFamily="34" charset="0"/>
               </a:defRPr>
             </a:lvl1pPr>
           </a:lstStyle>
@@ -10425,9 +10420,9 @@
           <a:solidFill>
             <a:schemeClr val="tx2"/>
           </a:solidFill>
-          <a:latin typeface="+mj-lt"/>
+          <a:latin typeface="Lucida Sans Unicode" panose="020B0602030504020204" pitchFamily="34" charset="0"/>
           <a:ea typeface="+mj-ea"/>
-          <a:cs typeface="+mj-cs"/>
+          <a:cs typeface="Lucida Sans Unicode" panose="020B0602030504020204" pitchFamily="34" charset="0"/>
         </a:defRPr>
       </a:lvl1pPr>
     </p:titleStyle>
@@ -10446,9 +10441,9 @@
           <a:solidFill>
             <a:schemeClr val="tx1"/>
           </a:solidFill>
-          <a:latin typeface="+mn-lt"/>
+          <a:latin typeface="Lucida Sans Unicode" panose="020B0602030504020204" pitchFamily="34" charset="0"/>
           <a:ea typeface="+mn-ea"/>
-          <a:cs typeface="+mn-cs"/>
+          <a:cs typeface="Lucida Sans Unicode" panose="020B0602030504020204" pitchFamily="34" charset="0"/>
         </a:defRPr>
       </a:lvl1pPr>
       <a:lvl2pPr marL="457200" indent="-182880" algn="r" defTabSz="914400" rtl="1" eaLnBrk="1" latinLnBrk="0" hangingPunct="1">
@@ -10465,9 +10460,9 @@
           <a:solidFill>
             <a:schemeClr val="tx1"/>
           </a:solidFill>
-          <a:latin typeface="+mn-lt"/>
+          <a:latin typeface="Lucida Sans Unicode" panose="020B0602030504020204" pitchFamily="34" charset="0"/>
           <a:ea typeface="+mn-ea"/>
-          <a:cs typeface="+mn-cs"/>
+          <a:cs typeface="Lucida Sans Unicode" panose="020B0602030504020204" pitchFamily="34" charset="0"/>
         </a:defRPr>
       </a:lvl2pPr>
       <a:lvl3pPr marL="731520" indent="-182880" algn="r" defTabSz="914400" rtl="1" eaLnBrk="1" latinLnBrk="0" hangingPunct="1">
@@ -10484,9 +10479,9 @@
           <a:solidFill>
             <a:schemeClr val="tx1"/>
           </a:solidFill>
-          <a:latin typeface="+mn-lt"/>
+          <a:latin typeface="Lucida Sans Unicode" panose="020B0602030504020204" pitchFamily="34" charset="0"/>
           <a:ea typeface="+mn-ea"/>
-          <a:cs typeface="+mn-cs"/>
+          <a:cs typeface="Lucida Sans Unicode" panose="020B0602030504020204" pitchFamily="34" charset="0"/>
         </a:defRPr>
       </a:lvl3pPr>
       <a:lvl4pPr marL="1005840" indent="-182880" algn="r" defTabSz="914400" rtl="1" eaLnBrk="1" latinLnBrk="0" hangingPunct="1">
@@ -10502,9 +10497,9 @@
           <a:solidFill>
             <a:schemeClr val="tx1"/>
           </a:solidFill>
-          <a:latin typeface="+mn-lt"/>
+          <a:latin typeface="Lucida Sans Unicode" panose="020B0602030504020204" pitchFamily="34" charset="0"/>
           <a:ea typeface="+mn-ea"/>
-          <a:cs typeface="+mn-cs"/>
+          <a:cs typeface="Lucida Sans Unicode" panose="020B0602030504020204" pitchFamily="34" charset="0"/>
         </a:defRPr>
       </a:lvl4pPr>
       <a:lvl5pPr marL="1188720" indent="-137160" algn="r" defTabSz="914400" rtl="1" eaLnBrk="1" latinLnBrk="0" hangingPunct="1">
@@ -10521,9 +10516,9 @@
           <a:solidFill>
             <a:schemeClr val="tx1"/>
           </a:solidFill>
-          <a:latin typeface="+mn-lt"/>
+          <a:latin typeface="Lucida Sans Unicode" panose="020B0602030504020204" pitchFamily="34" charset="0"/>
           <a:ea typeface="+mn-ea"/>
-          <a:cs typeface="+mn-cs"/>
+          <a:cs typeface="Lucida Sans Unicode" panose="020B0602030504020204" pitchFamily="34" charset="0"/>
         </a:defRPr>
       </a:lvl5pPr>
       <a:lvl6pPr marL="1371600" indent="-182880" algn="l" defTabSz="914400" rtl="0" eaLnBrk="1" latinLnBrk="0" hangingPunct="1">
@@ -10820,8 +10815,8 @@
           <a:lstStyle/>
           <a:p>
             <a:r>
-              <a:rPr lang="he-IL"/>
-              <a:t>מערכות הפעלה - תרגול 13</a:t>
+              <a:rPr lang="he-IL" dirty="0"/>
+              <a:t>מערכות הפעלה - תרגול 11</a:t>
             </a:r>
             <a:endParaRPr lang="en-US" dirty="0"/>
           </a:p>
@@ -11384,7 +11379,7 @@
           <p:nvPr/>
         </p:nvPicPr>
         <p:blipFill>
-          <a:blip r:embed="rId2">
+          <a:blip r:embed="rId3">
             <a:lum bright="-20000" contrast="40000"/>
           </a:blip>
           <a:stretch>
@@ -11664,7 +11659,9 @@
         </p:nvSpPr>
         <p:spPr/>
         <p:txBody>
-          <a:bodyPr/>
+          <a:bodyPr>
+            <a:normAutofit fontScale="92500"/>
+          </a:bodyPr>
           <a:lstStyle/>
           <a:p>
             <a:r>
@@ -11966,7 +11963,7 @@
         </p:spPr>
         <p:txBody>
           <a:bodyPr>
-            <a:normAutofit fontScale="92500"/>
+            <a:normAutofit fontScale="92500" lnSpcReduction="10000"/>
           </a:bodyPr>
           <a:lstStyle/>
           <a:p>
@@ -12089,7 +12086,7 @@
         </p:spPr>
         <p:txBody>
           <a:bodyPr>
-            <a:normAutofit fontScale="92500"/>
+            <a:normAutofit fontScale="92500" lnSpcReduction="10000"/>
           </a:bodyPr>
           <a:lstStyle/>
           <a:p>
@@ -21315,7 +21312,7 @@
         </p:xfrm>
         <a:graphic>
           <a:graphicData uri="http://schemas.openxmlformats.org/drawingml/2006/diagram">
-            <dgm:relIds xmlns:dgm="http://schemas.openxmlformats.org/drawingml/2006/diagram" xmlns:r="http://schemas.openxmlformats.org/officeDocument/2006/relationships" r:dm="rId3" r:lo="rId4" r:qs="rId5" r:cs="rId6"/>
+            <dgm:relIds xmlns:dgm="http://schemas.openxmlformats.org/drawingml/2006/diagram" xmlns:r="http://schemas.openxmlformats.org/officeDocument/2006/relationships" r:dm="rId2" r:lo="rId3" r:qs="rId4" r:cs="rId5"/>
           </a:graphicData>
         </a:graphic>
       </p:graphicFrame>
@@ -21343,7 +21340,7 @@
         </p:spPr>
         <p:txBody>
           <a:bodyPr>
-            <a:normAutofit/>
+            <a:normAutofit lnSpcReduction="10000"/>
           </a:bodyPr>
           <a:lstStyle/>
           <a:p>
@@ -21567,7 +21564,7 @@
         <p:spPr/>
         <p:txBody>
           <a:bodyPr>
-            <a:normAutofit/>
+            <a:normAutofit lnSpcReduction="10000"/>
           </a:bodyPr>
           <a:lstStyle/>
           <a:p>
@@ -21685,7 +21682,7 @@
         <p:spPr/>
         <p:txBody>
           <a:bodyPr>
-            <a:normAutofit/>
+            <a:normAutofit lnSpcReduction="10000"/>
           </a:bodyPr>
           <a:lstStyle/>
           <a:p>
@@ -21967,7 +21964,9 @@
           </a:xfrm>
         </p:spPr>
         <p:txBody>
-          <a:bodyPr/>
+          <a:bodyPr>
+            <a:normAutofit lnSpcReduction="10000"/>
+          </a:bodyPr>
           <a:lstStyle/>
           <a:p>
             <a:r>
@@ -22073,7 +22072,9 @@
           </a:xfrm>
         </p:spPr>
         <p:txBody>
-          <a:bodyPr/>
+          <a:bodyPr>
+            <a:normAutofit lnSpcReduction="10000"/>
+          </a:bodyPr>
           <a:lstStyle/>
           <a:p>
             <a:r>
@@ -22487,7 +22488,7 @@
         <p:spPr/>
         <p:txBody>
           <a:bodyPr>
-            <a:normAutofit/>
+            <a:normAutofit lnSpcReduction="10000"/>
           </a:bodyPr>
           <a:lstStyle/>
           <a:p>
@@ -24263,7 +24264,7 @@
         </p:spPr>
         <p:txBody>
           <a:bodyPr>
-            <a:normAutofit lnSpcReduction="10000"/>
+            <a:normAutofit fontScale="92500"/>
           </a:bodyPr>
           <a:lstStyle/>
           <a:p>
@@ -25998,7 +25999,9 @@
         </p:nvSpPr>
         <p:spPr/>
         <p:txBody>
-          <a:bodyPr/>
+          <a:bodyPr>
+            <a:normAutofit/>
+          </a:bodyPr>
           <a:lstStyle/>
           <a:p>
             <a:r>
@@ -26037,35 +26040,35 @@
               <a:buNone/>
             </a:pPr>
             <a:r>
-              <a:rPr lang="en-US" dirty="0" err="1"/>
+              <a:rPr lang="en-US" sz="2000" dirty="0" err="1"/>
               <a:t>inodeAddr</a:t>
             </a:r>
             <a:r>
-              <a:rPr lang="en-US" dirty="0"/>
+              <a:rPr lang="en-US" sz="2000" dirty="0"/>
               <a:t> = </a:t>
             </a:r>
             <a:r>
-              <a:rPr lang="en-US" dirty="0" err="1"/>
+              <a:rPr lang="en-US" sz="2000" dirty="0" err="1"/>
               <a:t>inodeTableAddr</a:t>
             </a:r>
             <a:r>
-              <a:rPr lang="en-US" dirty="0"/>
+              <a:rPr lang="en-US" sz="2000" dirty="0"/>
               <a:t> + (</a:t>
             </a:r>
             <a:r>
-              <a:rPr lang="en-US" dirty="0" err="1"/>
+              <a:rPr lang="en-US" sz="2000" dirty="0" err="1"/>
               <a:t>inodeNumber</a:t>
             </a:r>
             <a:r>
-              <a:rPr lang="en-US" dirty="0"/>
+              <a:rPr lang="en-US" sz="2000" dirty="0"/>
               <a:t> x </a:t>
             </a:r>
             <a:r>
-              <a:rPr lang="en-US" dirty="0" err="1"/>
+              <a:rPr lang="en-US" sz="2000" dirty="0" err="1"/>
               <a:t>inodeSize</a:t>
             </a:r>
             <a:r>
-              <a:rPr lang="en-US" dirty="0"/>
+              <a:rPr lang="en-US" sz="2000" dirty="0"/>
               <a:t>)</a:t>
             </a:r>
           </a:p>
@@ -26074,8 +26077,8 @@
               <a:buNone/>
             </a:pPr>
             <a:r>
-              <a:rPr lang="en-US" dirty="0"/>
-              <a:t>	         |-----in bytes-----|			|--in bytes--|</a:t>
+              <a:rPr lang="en-US" sz="2000" dirty="0"/>
+              <a:t>	     |-----in bytes-----|		    |--in bytes--|</a:t>
             </a:r>
           </a:p>
           <a:p>
@@ -26089,22 +26092,22 @@
               <a:buNone/>
             </a:pPr>
             <a:r>
-              <a:rPr lang="en-US" dirty="0"/>
+              <a:rPr lang="en-US" sz="2000" dirty="0"/>
               <a:t>sector = </a:t>
             </a:r>
             <a:r>
-              <a:rPr lang="en-US" dirty="0" err="1"/>
+              <a:rPr lang="en-US" sz="2000" dirty="0" err="1"/>
               <a:t>inodeAddr</a:t>
             </a:r>
             <a:r>
-              <a:rPr lang="en-US" dirty="0"/>
+              <a:rPr lang="en-US" sz="2000" dirty="0"/>
               <a:t> / </a:t>
             </a:r>
             <a:r>
-              <a:rPr lang="en-US" dirty="0" err="1"/>
+              <a:rPr lang="en-US" sz="2000" dirty="0" err="1"/>
               <a:t>sectorSize</a:t>
             </a:r>
-            <a:endParaRPr lang="en-US" dirty="0"/>
+            <a:endParaRPr lang="en-US" sz="2000" dirty="0"/>
           </a:p>
           <a:p>
             <a:endParaRPr lang="en-US" dirty="0"/>
@@ -26450,7 +26453,9 @@
         </p:nvSpPr>
         <p:spPr/>
         <p:txBody>
-          <a:bodyPr/>
+          <a:bodyPr>
+            <a:normAutofit fontScale="90000"/>
+          </a:bodyPr>
           <a:lstStyle/>
           <a:p>
             <a:r>
@@ -26479,7 +26484,7 @@
         <p:spPr/>
         <p:txBody>
           <a:bodyPr>
-            <a:normAutofit/>
+            <a:normAutofit fontScale="92500"/>
           </a:bodyPr>
           <a:lstStyle/>
           <a:p>
@@ -27435,7 +27440,9 @@
         </p:nvSpPr>
         <p:spPr/>
         <p:txBody>
-          <a:bodyPr/>
+          <a:bodyPr>
+            <a:normAutofit fontScale="92500"/>
+          </a:bodyPr>
           <a:lstStyle/>
           <a:p>
             <a:pPr marL="457200" indent="-457200">
@@ -28349,14 +28356,14 @@
           <p:nvPr>
             <p:extLst>
               <p:ext uri="{D42A27DB-BD31-4B8C-83A1-F6EECF244321}">
-                <p14:modId xmlns:p14="http://schemas.microsoft.com/office/powerpoint/2010/main" val="1158389647"/>
+                <p14:modId xmlns:p14="http://schemas.microsoft.com/office/powerpoint/2010/main" val="75342797"/>
               </p:ext>
             </p:extLst>
           </p:nvPr>
         </p:nvGraphicFramePr>
         <p:xfrm>
-          <a:off x="1524000" y="3527156"/>
-          <a:ext cx="5943600" cy="2194560"/>
+          <a:off x="1524000" y="3757353"/>
+          <a:ext cx="5943600" cy="2103120"/>
         </p:xfrm>
         <a:graphic>
           <a:graphicData uri="http://schemas.openxmlformats.org/drawingml/2006/table">
@@ -28380,7 +28387,7 @@
                   </a:extLst>
                 </a:gridCol>
               </a:tblGrid>
-              <a:tr h="548640">
+              <a:tr h="318443">
                 <a:tc>
                   <a:txBody>
                     <a:bodyPr/>
@@ -28945,7 +28952,7 @@
         <p:spPr/>
         <p:txBody>
           <a:bodyPr>
-            <a:normAutofit/>
+            <a:normAutofit fontScale="92500"/>
           </a:bodyPr>
           <a:lstStyle/>
           <a:p>
@@ -29828,7 +29835,9 @@
         </p:nvSpPr>
         <p:spPr/>
         <p:txBody>
-          <a:bodyPr/>
+          <a:bodyPr>
+            <a:normAutofit lnSpcReduction="10000"/>
+          </a:bodyPr>
           <a:lstStyle/>
           <a:p>
             <a:r>
@@ -30196,13 +30205,13 @@
           <p:nvPr>
             <p:extLst>
               <p:ext uri="{D42A27DB-BD31-4B8C-83A1-F6EECF244321}">
-                <p14:modId xmlns:p14="http://schemas.microsoft.com/office/powerpoint/2010/main" val="2528647945"/>
+                <p14:modId xmlns:p14="http://schemas.microsoft.com/office/powerpoint/2010/main" val="2833877791"/>
               </p:ext>
             </p:extLst>
           </p:nvPr>
         </p:nvGraphicFramePr>
         <p:xfrm>
-          <a:off x="457200" y="4188421"/>
+          <a:off x="495993" y="4637309"/>
           <a:ext cx="8229600" cy="457200"/>
         </p:xfrm>
         <a:graphic>
@@ -30735,13 +30744,13 @@
           <p:nvPr>
             <p:extLst>
               <p:ext uri="{D42A27DB-BD31-4B8C-83A1-F6EECF244321}">
-                <p14:modId xmlns:p14="http://schemas.microsoft.com/office/powerpoint/2010/main" val="1251685995"/>
+                <p14:modId xmlns:p14="http://schemas.microsoft.com/office/powerpoint/2010/main" val="1141947688"/>
               </p:ext>
             </p:extLst>
           </p:nvPr>
         </p:nvGraphicFramePr>
         <p:xfrm>
-          <a:off x="1143000" y="2209800"/>
+          <a:off x="1104207" y="2470265"/>
           <a:ext cx="6858000" cy="1828800"/>
         </p:xfrm>
         <a:graphic>
@@ -31018,7 +31027,15 @@
           <a:p>
             <a:r>
               <a:rPr lang="he-IL" dirty="0"/>
-              <a:t>שאלה ממבחן</a:t>
+              <a:t>שאלה ממבחן </a:t>
+            </a:r>
+            <a:r>
+              <a:rPr lang="en-US" dirty="0"/>
+              <a:t>D</a:t>
+            </a:r>
+            <a:r>
+              <a:rPr lang="he-IL" dirty="0"/>
+              <a:t>:</a:t>
             </a:r>
             <a:endParaRPr lang="en-US" dirty="0"/>
           </a:p>
@@ -31189,7 +31206,7 @@
         <p:spPr/>
         <p:txBody>
           <a:bodyPr>
-            <a:normAutofit/>
+            <a:normAutofit lnSpcReduction="10000"/>
           </a:bodyPr>
           <a:lstStyle/>
           <a:p>
@@ -31363,7 +31380,7 @@
         </p:blipFill>
         <p:spPr>
           <a:xfrm>
-            <a:off x="476249" y="3852379"/>
+            <a:off x="476249" y="4323434"/>
             <a:ext cx="8191501" cy="595635"/>
           </a:xfrm>
           <a:prstGeom prst="rect">
@@ -31784,7 +31801,7 @@
         <p:spPr/>
         <p:txBody>
           <a:bodyPr>
-            <a:normAutofit/>
+            <a:normAutofit fontScale="92500" lnSpcReduction="10000"/>
           </a:bodyPr>
           <a:lstStyle/>
           <a:p>
@@ -32599,7 +32616,9 @@
         </p:nvSpPr>
         <p:spPr/>
         <p:txBody>
-          <a:bodyPr/>
+          <a:bodyPr>
+            <a:normAutofit lnSpcReduction="10000"/>
+          </a:bodyPr>
           <a:lstStyle/>
           <a:p>
             <a:r>
@@ -32788,7 +32807,9 @@
         </p:nvSpPr>
         <p:spPr/>
         <p:txBody>
-          <a:bodyPr/>
+          <a:bodyPr>
+            <a:normAutofit lnSpcReduction="10000"/>
+          </a:bodyPr>
           <a:lstStyle/>
           <a:p>
             <a:r>
@@ -33204,7 +33225,7 @@
         </p:nvSpPr>
         <p:spPr>
           <a:xfrm>
-            <a:off x="457201" y="5196840"/>
+            <a:off x="457201" y="5368637"/>
             <a:ext cx="8229599" cy="1280160"/>
           </a:xfrm>
           <a:prstGeom prst="roundRect">

</xml_diff>